<commit_message>
Updated README.md and Presentation.pptx
</commit_message>
<xml_diff>
--- a/Presentation.pptx
+++ b/Presentation.pptx
@@ -4357,12 +4357,113 @@
           <a:chExt cx="0" cy="0"/>
         </a:xfrm>
       </p:grpSpPr>
+      <p:sp>
+        <p:nvSpPr>
+          <p:cNvPr id="2" name="Title 1">
+            <a:extLst>
+              <a:ext uri="{FF2B5EF4-FFF2-40B4-BE49-F238E27FC236}">
+                <a16:creationId xmlns:a16="http://schemas.microsoft.com/office/drawing/2014/main" id="{A9EFB809-5A24-A0DD-1497-EC3F8F8E8F0E}"/>
+              </a:ext>
+            </a:extLst>
+          </p:cNvPr>
+          <p:cNvSpPr>
+            <a:spLocks noGrp="1"/>
+          </p:cNvSpPr>
+          <p:nvPr>
+            <p:ph type="title"/>
+          </p:nvPr>
+        </p:nvSpPr>
+        <p:spPr>
+          <a:xfrm>
+            <a:off x="838200" y="365125"/>
+            <a:ext cx="10515600" cy="1325563"/>
+          </a:xfrm>
+        </p:spPr>
+        <p:txBody>
+          <a:bodyPr/>
+          <a:lstStyle/>
+          <a:p>
+            <a:r>
+              <a:rPr lang="cs-CZ" dirty="0"/>
+              <a:t>Database</a:t>
+            </a:r>
+          </a:p>
+        </p:txBody>
+      </p:sp>
+      <p:sp>
+        <p:nvSpPr>
+          <p:cNvPr id="4" name="Content Placeholder 2">
+            <a:extLst>
+              <a:ext uri="{FF2B5EF4-FFF2-40B4-BE49-F238E27FC236}">
+                <a16:creationId xmlns:a16="http://schemas.microsoft.com/office/drawing/2014/main" id="{0BADA7F5-AEFD-1321-6BB0-48081A7607F0}"/>
+              </a:ext>
+            </a:extLst>
+          </p:cNvPr>
+          <p:cNvSpPr>
+            <a:spLocks noGrp="1"/>
+          </p:cNvSpPr>
+          <p:nvPr>
+            <p:ph idx="1"/>
+          </p:nvPr>
+        </p:nvSpPr>
+        <p:spPr>
+          <a:xfrm>
+            <a:off x="838200" y="1825625"/>
+            <a:ext cx="10515600" cy="4351338"/>
+          </a:xfrm>
+        </p:spPr>
+        <p:txBody>
+          <a:bodyPr/>
+          <a:lstStyle/>
+          <a:p>
+            <a:r>
+              <a:rPr lang="cs-CZ" dirty="0"/>
+              <a:t>21 </a:t>
+            </a:r>
+            <a:r>
+              <a:rPr lang="cs-CZ" dirty="0" err="1"/>
+              <a:t>tables</a:t>
+            </a:r>
+            <a:endParaRPr lang="cs-CZ" dirty="0"/>
+          </a:p>
+          <a:p>
+            <a:r>
+              <a:rPr lang="cs-CZ" dirty="0"/>
+              <a:t>40 </a:t>
+            </a:r>
+            <a:r>
+              <a:rPr lang="cs-CZ" dirty="0" err="1"/>
+              <a:t>endpoints</a:t>
+            </a:r>
+            <a:endParaRPr lang="cs-CZ" dirty="0"/>
+          </a:p>
+          <a:p>
+            <a:r>
+              <a:rPr lang="cs-CZ" dirty="0"/>
+              <a:t>+ </a:t>
+            </a:r>
+            <a:r>
+              <a:rPr lang="cs-CZ" dirty="0" err="1"/>
+              <a:t>uploading</a:t>
+            </a:r>
+            <a:r>
+              <a:rPr lang="cs-CZ" dirty="0"/>
+              <a:t> </a:t>
+            </a:r>
+            <a:r>
+              <a:rPr lang="cs-CZ" dirty="0" err="1"/>
+              <a:t>endpoints</a:t>
+            </a:r>
+            <a:endParaRPr lang="cs-CZ" dirty="0"/>
+          </a:p>
+        </p:txBody>
+      </p:sp>
       <p:pic>
         <p:nvPicPr>
-          <p:cNvPr id="3" name="Picture 2" descr="A screenshot of a computer&#10;&#10;AI-generated content may be incorrect.">
-            <a:extLst>
-              <a:ext uri="{FF2B5EF4-FFF2-40B4-BE49-F238E27FC236}">
-                <a16:creationId xmlns:a16="http://schemas.microsoft.com/office/drawing/2014/main" id="{8AB6F0C6-A7F0-C6B2-765E-BCEA8A358E35}"/>
+          <p:cNvPr id="6" name="Picture 5" descr="A screenshot of a computer&#10;&#10;AI-generated content may be incorrect.">
+            <a:extLst>
+              <a:ext uri="{FF2B5EF4-FFF2-40B4-BE49-F238E27FC236}">
+                <a16:creationId xmlns:a16="http://schemas.microsoft.com/office/drawing/2014/main" id="{83DCCC34-838B-AB44-B77D-C4D0F798F4DA}"/>
               </a:ext>
             </a:extLst>
           </p:cNvPr>
@@ -4379,115 +4480,14 @@
         </p:blipFill>
         <p:spPr>
           <a:xfrm>
-            <a:off x="6096000" y="595747"/>
-            <a:ext cx="4567129" cy="5666506"/>
+            <a:off x="4907526" y="1092469"/>
+            <a:ext cx="6803350" cy="4673061"/>
           </a:xfrm>
           <a:prstGeom prst="rect">
             <a:avLst/>
           </a:prstGeom>
         </p:spPr>
       </p:pic>
-      <p:sp>
-        <p:nvSpPr>
-          <p:cNvPr id="2" name="Title 1">
-            <a:extLst>
-              <a:ext uri="{FF2B5EF4-FFF2-40B4-BE49-F238E27FC236}">
-                <a16:creationId xmlns:a16="http://schemas.microsoft.com/office/drawing/2014/main" id="{A9EFB809-5A24-A0DD-1497-EC3F8F8E8F0E}"/>
-              </a:ext>
-            </a:extLst>
-          </p:cNvPr>
-          <p:cNvSpPr>
-            <a:spLocks noGrp="1"/>
-          </p:cNvSpPr>
-          <p:nvPr>
-            <p:ph type="title"/>
-          </p:nvPr>
-        </p:nvSpPr>
-        <p:spPr>
-          <a:xfrm>
-            <a:off x="838200" y="365125"/>
-            <a:ext cx="10515600" cy="1325563"/>
-          </a:xfrm>
-        </p:spPr>
-        <p:txBody>
-          <a:bodyPr/>
-          <a:lstStyle/>
-          <a:p>
-            <a:r>
-              <a:rPr lang="cs-CZ" dirty="0"/>
-              <a:t>Database</a:t>
-            </a:r>
-          </a:p>
-        </p:txBody>
-      </p:sp>
-      <p:sp>
-        <p:nvSpPr>
-          <p:cNvPr id="4" name="Content Placeholder 2">
-            <a:extLst>
-              <a:ext uri="{FF2B5EF4-FFF2-40B4-BE49-F238E27FC236}">
-                <a16:creationId xmlns:a16="http://schemas.microsoft.com/office/drawing/2014/main" id="{0BADA7F5-AEFD-1321-6BB0-48081A7607F0}"/>
-              </a:ext>
-            </a:extLst>
-          </p:cNvPr>
-          <p:cNvSpPr>
-            <a:spLocks noGrp="1"/>
-          </p:cNvSpPr>
-          <p:nvPr>
-            <p:ph idx="1"/>
-          </p:nvPr>
-        </p:nvSpPr>
-        <p:spPr>
-          <a:xfrm>
-            <a:off x="838200" y="1825625"/>
-            <a:ext cx="10515600" cy="4351338"/>
-          </a:xfrm>
-        </p:spPr>
-        <p:txBody>
-          <a:bodyPr/>
-          <a:lstStyle/>
-          <a:p>
-            <a:r>
-              <a:rPr lang="cs-CZ" dirty="0"/>
-              <a:t>21 </a:t>
-            </a:r>
-            <a:r>
-              <a:rPr lang="cs-CZ" dirty="0" err="1"/>
-              <a:t>tables</a:t>
-            </a:r>
-            <a:endParaRPr lang="cs-CZ" dirty="0"/>
-          </a:p>
-          <a:p>
-            <a:r>
-              <a:rPr lang="cs-CZ" dirty="0"/>
-              <a:t>40 </a:t>
-            </a:r>
-            <a:r>
-              <a:rPr lang="cs-CZ" dirty="0" err="1"/>
-              <a:t>endpoints</a:t>
-            </a:r>
-            <a:endParaRPr lang="cs-CZ" dirty="0"/>
-          </a:p>
-          <a:p>
-            <a:r>
-              <a:rPr lang="cs-CZ" dirty="0"/>
-              <a:t>+ </a:t>
-            </a:r>
-            <a:r>
-              <a:rPr lang="cs-CZ" dirty="0" err="1"/>
-              <a:t>uploading</a:t>
-            </a:r>
-            <a:r>
-              <a:rPr lang="cs-CZ" dirty="0"/>
-              <a:t> </a:t>
-            </a:r>
-            <a:r>
-              <a:rPr lang="cs-CZ" dirty="0" err="1"/>
-              <a:t>enpoints</a:t>
-            </a:r>
-            <a:endParaRPr lang="cs-CZ" dirty="0"/>
-          </a:p>
-        </p:txBody>
-      </p:sp>
     </p:spTree>
     <p:extLst>
       <p:ext uri="{BB962C8B-B14F-4D97-AF65-F5344CB8AC3E}">

</xml_diff>